<commit_message>
majors to job csvs
</commit_message>
<xml_diff>
--- a/model/The FortunED Tellers.pptx
+++ b/model/The FortunED Tellers.pptx
@@ -108,6 +108,11 @@
       </a:defRPr>
     </a:lvl9pPr>
   </p:defaultTextStyle>
+  <p:extLst>
+    <p:ext uri="{EFAFB233-063F-42B5-8137-9DF3F51BA10A}">
+      <p15:sldGuideLst xmlns:p15="http://schemas.microsoft.com/office/powerpoint/2012/main"/>
+    </p:ext>
+  </p:extLst>
 </p:presentation>
 </file>
 
@@ -258,7 +263,7 @@
           <a:p>
             <a:fld id="{E0358E31-6777-4A85-8A1E-903098430EC0}" type="datetimeFigureOut">
               <a:rPr lang="en-US" smtClean="0"/>
-              <a:t>6/30/2020</a:t>
+              <a:t>7/1/2020</a:t>
             </a:fld>
             <a:endParaRPr lang="en-US"/>
           </a:p>
@@ -456,7 +461,7 @@
           <a:p>
             <a:fld id="{E0358E31-6777-4A85-8A1E-903098430EC0}" type="datetimeFigureOut">
               <a:rPr lang="en-US" smtClean="0"/>
-              <a:t>6/30/2020</a:t>
+              <a:t>7/1/2020</a:t>
             </a:fld>
             <a:endParaRPr lang="en-US"/>
           </a:p>
@@ -664,7 +669,7 @@
           <a:p>
             <a:fld id="{E0358E31-6777-4A85-8A1E-903098430EC0}" type="datetimeFigureOut">
               <a:rPr lang="en-US" smtClean="0"/>
-              <a:t>6/30/2020</a:t>
+              <a:t>7/1/2020</a:t>
             </a:fld>
             <a:endParaRPr lang="en-US"/>
           </a:p>
@@ -862,7 +867,7 @@
           <a:p>
             <a:fld id="{E0358E31-6777-4A85-8A1E-903098430EC0}" type="datetimeFigureOut">
               <a:rPr lang="en-US" smtClean="0"/>
-              <a:t>6/30/2020</a:t>
+              <a:t>7/1/2020</a:t>
             </a:fld>
             <a:endParaRPr lang="en-US"/>
           </a:p>
@@ -1137,7 +1142,7 @@
           <a:p>
             <a:fld id="{E0358E31-6777-4A85-8A1E-903098430EC0}" type="datetimeFigureOut">
               <a:rPr lang="en-US" smtClean="0"/>
-              <a:t>6/30/2020</a:t>
+              <a:t>7/1/2020</a:t>
             </a:fld>
             <a:endParaRPr lang="en-US"/>
           </a:p>
@@ -1402,7 +1407,7 @@
           <a:p>
             <a:fld id="{E0358E31-6777-4A85-8A1E-903098430EC0}" type="datetimeFigureOut">
               <a:rPr lang="en-US" smtClean="0"/>
-              <a:t>6/30/2020</a:t>
+              <a:t>7/1/2020</a:t>
             </a:fld>
             <a:endParaRPr lang="en-US"/>
           </a:p>
@@ -1814,7 +1819,7 @@
           <a:p>
             <a:fld id="{E0358E31-6777-4A85-8A1E-903098430EC0}" type="datetimeFigureOut">
               <a:rPr lang="en-US" smtClean="0"/>
-              <a:t>6/30/2020</a:t>
+              <a:t>7/1/2020</a:t>
             </a:fld>
             <a:endParaRPr lang="en-US"/>
           </a:p>
@@ -1955,7 +1960,7 @@
           <a:p>
             <a:fld id="{E0358E31-6777-4A85-8A1E-903098430EC0}" type="datetimeFigureOut">
               <a:rPr lang="en-US" smtClean="0"/>
-              <a:t>6/30/2020</a:t>
+              <a:t>7/1/2020</a:t>
             </a:fld>
             <a:endParaRPr lang="en-US"/>
           </a:p>
@@ -2068,7 +2073,7 @@
           <a:p>
             <a:fld id="{E0358E31-6777-4A85-8A1E-903098430EC0}" type="datetimeFigureOut">
               <a:rPr lang="en-US" smtClean="0"/>
-              <a:t>6/30/2020</a:t>
+              <a:t>7/1/2020</a:t>
             </a:fld>
             <a:endParaRPr lang="en-US"/>
           </a:p>
@@ -2379,7 +2384,7 @@
           <a:p>
             <a:fld id="{E0358E31-6777-4A85-8A1E-903098430EC0}" type="datetimeFigureOut">
               <a:rPr lang="en-US" smtClean="0"/>
-              <a:t>6/30/2020</a:t>
+              <a:t>7/1/2020</a:t>
             </a:fld>
             <a:endParaRPr lang="en-US"/>
           </a:p>
@@ -2667,7 +2672,7 @@
           <a:p>
             <a:fld id="{E0358E31-6777-4A85-8A1E-903098430EC0}" type="datetimeFigureOut">
               <a:rPr lang="en-US" smtClean="0"/>
-              <a:t>6/30/2020</a:t>
+              <a:t>7/1/2020</a:t>
             </a:fld>
             <a:endParaRPr lang="en-US"/>
           </a:p>
@@ -2908,7 +2913,7 @@
           <a:p>
             <a:fld id="{E0358E31-6777-4A85-8A1E-903098430EC0}" type="datetimeFigureOut">
               <a:rPr lang="en-US" smtClean="0"/>
-              <a:t>6/30/2020</a:t>
+              <a:t>7/1/2020</a:t>
             </a:fld>
             <a:endParaRPr lang="en-US"/>
           </a:p>
@@ -3641,19 +3646,15 @@
             <a:pPr lvl="1"/>
             <a:r>
               <a:rPr lang="en-US" dirty="0"/>
-              <a:t>Starting Salary (if available)</a:t>
+              <a:t>Starting – Mid – Senior Salary Projections</a:t>
             </a:r>
           </a:p>
           <a:p>
             <a:pPr lvl="1"/>
             <a:r>
               <a:rPr lang="en-US" dirty="0"/>
-              <a:t>Career options within Industry (if we can map that)</a:t>
-            </a:r>
-          </a:p>
-          <a:p>
-            <a:pPr lvl="1"/>
-            <a:endParaRPr lang="en-US" dirty="0"/>
+              <a:t>Career options within Industry</a:t>
+            </a:r>
           </a:p>
         </p:txBody>
       </p:sp>
@@ -3739,7 +3740,7 @@
         </p:spPr>
         <p:txBody>
           <a:bodyPr>
-            <a:normAutofit lnSpcReduction="10000"/>
+            <a:normAutofit fontScale="85000" lnSpcReduction="20000"/>
           </a:bodyPr>
           <a:lstStyle/>
           <a:p>
@@ -3773,6 +3774,12 @@
             </a:r>
           </a:p>
           <a:p>
+            <a:r>
+              <a:rPr lang="en-US" dirty="0"/>
+              <a:t>Ideal City/State to work in?</a:t>
+            </a:r>
+          </a:p>
+          <a:p>
             <a:endParaRPr lang="en-US" dirty="0"/>
           </a:p>
           <a:p>
@@ -3792,27 +3799,53 @@
             <a:pPr lvl="1"/>
             <a:r>
               <a:rPr lang="en-US" dirty="0"/>
-              <a:t>Cost of living vs Starting Salary (create algorithm)</a:t>
+              <a:t>Show range of starting salaries</a:t>
+            </a:r>
+          </a:p>
+          <a:p>
+            <a:pPr lvl="1"/>
+            <a:r>
+              <a:rPr lang="en-US" dirty="0">
+                <a:solidFill>
+                  <a:srgbClr val="FFC000"/>
+                </a:solidFill>
+              </a:rPr>
+              <a:t>Cost of living vs P25 starting salary (create algorithm)</a:t>
             </a:r>
           </a:p>
           <a:p>
             <a:pPr lvl="2"/>
             <a:r>
+              <a:rPr lang="en-US" dirty="0">
+                <a:solidFill>
+                  <a:srgbClr val="FFC000"/>
+                </a:solidFill>
+              </a:rPr>
+              <a:t>Options of cities more favorable based on starting salary</a:t>
+            </a:r>
+          </a:p>
+          <a:p>
+            <a:pPr lvl="1"/>
+            <a:r>
               <a:rPr lang="en-US" dirty="0"/>
-              <a:t>Rank of cities to job hunt</a:t>
+              <a:t>How long it will take to pay off student loan (ML)</a:t>
+            </a:r>
+          </a:p>
+          <a:p>
+            <a:pPr lvl="2"/>
+            <a:r>
+              <a:rPr lang="en-US" dirty="0"/>
+              <a:t>Tuition, Starting Salary, Cost of living, Question: What percent of salary will you spend towards Loan?</a:t>
             </a:r>
           </a:p>
           <a:p>
             <a:pPr lvl="1"/>
             <a:r>
-              <a:rPr lang="en-US" dirty="0"/>
-              <a:t>How much they have to pay every month to pay off student loan (ML)</a:t>
-            </a:r>
-          </a:p>
-          <a:p>
-            <a:pPr lvl="1"/>
-            <a:r>
-              <a:rPr lang="en-US" dirty="0"/>
+              <a:rPr lang="en-US" dirty="0">
+                <a:solidFill>
+                  <a:srgbClr val="FFC000"/>
+                </a:solidFill>
+              </a:rPr>
               <a:t>Scrape indeed for Internships based on industry and state (if we have time)</a:t>
             </a:r>
           </a:p>
@@ -3924,14 +3957,10 @@
             <a:pPr lvl="1"/>
             <a:r>
               <a:rPr lang="en-US" dirty="0"/>
-              <a:t>Some </a:t>
-            </a:r>
-            <a:r>
-              <a:rPr lang="en-US"/>
-              <a:t>graphs from here: </a:t>
-            </a:r>
-            <a:r>
-              <a:rPr lang="en-US">
+              <a:t>Some graphs from here: </a:t>
+            </a:r>
+            <a:r>
+              <a:rPr lang="en-US" dirty="0">
                 <a:hlinkClick r:id="rId2"/>
               </a:rPr>
               <a:t>https://www.valuepenguin.com/student-loans/average-cost-of-college</a:t>

</xml_diff>

<commit_message>
major to job CSVs
</commit_message>
<xml_diff>
--- a/model/The FortunED Tellers.pptx
+++ b/model/The FortunED Tellers.pptx
@@ -108,6 +108,11 @@
       </a:defRPr>
     </a:lvl9pPr>
   </p:defaultTextStyle>
+  <p:extLst>
+    <p:ext uri="{EFAFB233-063F-42B5-8137-9DF3F51BA10A}">
+      <p15:sldGuideLst xmlns:p15="http://schemas.microsoft.com/office/powerpoint/2012/main"/>
+    </p:ext>
+  </p:extLst>
 </p:presentation>
 </file>
 
@@ -258,7 +263,7 @@
           <a:p>
             <a:fld id="{E0358E31-6777-4A85-8A1E-903098430EC0}" type="datetimeFigureOut">
               <a:rPr lang="en-US" smtClean="0"/>
-              <a:t>6/30/2020</a:t>
+              <a:t>7/1/2020</a:t>
             </a:fld>
             <a:endParaRPr lang="en-US"/>
           </a:p>
@@ -456,7 +461,7 @@
           <a:p>
             <a:fld id="{E0358E31-6777-4A85-8A1E-903098430EC0}" type="datetimeFigureOut">
               <a:rPr lang="en-US" smtClean="0"/>
-              <a:t>6/30/2020</a:t>
+              <a:t>7/1/2020</a:t>
             </a:fld>
             <a:endParaRPr lang="en-US"/>
           </a:p>
@@ -664,7 +669,7 @@
           <a:p>
             <a:fld id="{E0358E31-6777-4A85-8A1E-903098430EC0}" type="datetimeFigureOut">
               <a:rPr lang="en-US" smtClean="0"/>
-              <a:t>6/30/2020</a:t>
+              <a:t>7/1/2020</a:t>
             </a:fld>
             <a:endParaRPr lang="en-US"/>
           </a:p>
@@ -862,7 +867,7 @@
           <a:p>
             <a:fld id="{E0358E31-6777-4A85-8A1E-903098430EC0}" type="datetimeFigureOut">
               <a:rPr lang="en-US" smtClean="0"/>
-              <a:t>6/30/2020</a:t>
+              <a:t>7/1/2020</a:t>
             </a:fld>
             <a:endParaRPr lang="en-US"/>
           </a:p>
@@ -1137,7 +1142,7 @@
           <a:p>
             <a:fld id="{E0358E31-6777-4A85-8A1E-903098430EC0}" type="datetimeFigureOut">
               <a:rPr lang="en-US" smtClean="0"/>
-              <a:t>6/30/2020</a:t>
+              <a:t>7/1/2020</a:t>
             </a:fld>
             <a:endParaRPr lang="en-US"/>
           </a:p>
@@ -1402,7 +1407,7 @@
           <a:p>
             <a:fld id="{E0358E31-6777-4A85-8A1E-903098430EC0}" type="datetimeFigureOut">
               <a:rPr lang="en-US" smtClean="0"/>
-              <a:t>6/30/2020</a:t>
+              <a:t>7/1/2020</a:t>
             </a:fld>
             <a:endParaRPr lang="en-US"/>
           </a:p>
@@ -1814,7 +1819,7 @@
           <a:p>
             <a:fld id="{E0358E31-6777-4A85-8A1E-903098430EC0}" type="datetimeFigureOut">
               <a:rPr lang="en-US" smtClean="0"/>
-              <a:t>6/30/2020</a:t>
+              <a:t>7/1/2020</a:t>
             </a:fld>
             <a:endParaRPr lang="en-US"/>
           </a:p>
@@ -1955,7 +1960,7 @@
           <a:p>
             <a:fld id="{E0358E31-6777-4A85-8A1E-903098430EC0}" type="datetimeFigureOut">
               <a:rPr lang="en-US" smtClean="0"/>
-              <a:t>6/30/2020</a:t>
+              <a:t>7/1/2020</a:t>
             </a:fld>
             <a:endParaRPr lang="en-US"/>
           </a:p>
@@ -2068,7 +2073,7 @@
           <a:p>
             <a:fld id="{E0358E31-6777-4A85-8A1E-903098430EC0}" type="datetimeFigureOut">
               <a:rPr lang="en-US" smtClean="0"/>
-              <a:t>6/30/2020</a:t>
+              <a:t>7/1/2020</a:t>
             </a:fld>
             <a:endParaRPr lang="en-US"/>
           </a:p>
@@ -2379,7 +2384,7 @@
           <a:p>
             <a:fld id="{E0358E31-6777-4A85-8A1E-903098430EC0}" type="datetimeFigureOut">
               <a:rPr lang="en-US" smtClean="0"/>
-              <a:t>6/30/2020</a:t>
+              <a:t>7/1/2020</a:t>
             </a:fld>
             <a:endParaRPr lang="en-US"/>
           </a:p>
@@ -2667,7 +2672,7 @@
           <a:p>
             <a:fld id="{E0358E31-6777-4A85-8A1E-903098430EC0}" type="datetimeFigureOut">
               <a:rPr lang="en-US" smtClean="0"/>
-              <a:t>6/30/2020</a:t>
+              <a:t>7/1/2020</a:t>
             </a:fld>
             <a:endParaRPr lang="en-US"/>
           </a:p>
@@ -2908,7 +2913,7 @@
           <a:p>
             <a:fld id="{E0358E31-6777-4A85-8A1E-903098430EC0}" type="datetimeFigureOut">
               <a:rPr lang="en-US" smtClean="0"/>
-              <a:t>6/30/2020</a:t>
+              <a:t>7/1/2020</a:t>
             </a:fld>
             <a:endParaRPr lang="en-US"/>
           </a:p>
@@ -3641,19 +3646,15 @@
             <a:pPr lvl="1"/>
             <a:r>
               <a:rPr lang="en-US" dirty="0"/>
-              <a:t>Starting Salary (if available)</a:t>
+              <a:t>Starting – Mid – Senior Salary Projections</a:t>
             </a:r>
           </a:p>
           <a:p>
             <a:pPr lvl="1"/>
             <a:r>
               <a:rPr lang="en-US" dirty="0"/>
-              <a:t>Career options within Industry (if we can map that)</a:t>
-            </a:r>
-          </a:p>
-          <a:p>
-            <a:pPr lvl="1"/>
-            <a:endParaRPr lang="en-US" dirty="0"/>
+              <a:t>Career options within Industry</a:t>
+            </a:r>
           </a:p>
         </p:txBody>
       </p:sp>
@@ -3739,7 +3740,7 @@
         </p:spPr>
         <p:txBody>
           <a:bodyPr>
-            <a:normAutofit lnSpcReduction="10000"/>
+            <a:normAutofit fontScale="85000" lnSpcReduction="20000"/>
           </a:bodyPr>
           <a:lstStyle/>
           <a:p>
@@ -3773,6 +3774,12 @@
             </a:r>
           </a:p>
           <a:p>
+            <a:r>
+              <a:rPr lang="en-US" dirty="0"/>
+              <a:t>Ideal City/State to work in?</a:t>
+            </a:r>
+          </a:p>
+          <a:p>
             <a:endParaRPr lang="en-US" dirty="0"/>
           </a:p>
           <a:p>
@@ -3792,27 +3799,53 @@
             <a:pPr lvl="1"/>
             <a:r>
               <a:rPr lang="en-US" dirty="0"/>
-              <a:t>Cost of living vs Starting Salary (create algorithm)</a:t>
+              <a:t>Show range of starting salaries</a:t>
+            </a:r>
+          </a:p>
+          <a:p>
+            <a:pPr lvl="1"/>
+            <a:r>
+              <a:rPr lang="en-US" dirty="0">
+                <a:solidFill>
+                  <a:srgbClr val="FFC000"/>
+                </a:solidFill>
+              </a:rPr>
+              <a:t>Cost of living vs P25 starting salary (create algorithm)</a:t>
             </a:r>
           </a:p>
           <a:p>
             <a:pPr lvl="2"/>
             <a:r>
+              <a:rPr lang="en-US" dirty="0">
+                <a:solidFill>
+                  <a:srgbClr val="FFC000"/>
+                </a:solidFill>
+              </a:rPr>
+              <a:t>Options of cities more favorable based on starting salary</a:t>
+            </a:r>
+          </a:p>
+          <a:p>
+            <a:pPr lvl="1"/>
+            <a:r>
               <a:rPr lang="en-US" dirty="0"/>
-              <a:t>Rank of cities to job hunt</a:t>
+              <a:t>How long it will take to pay off student loan (ML)</a:t>
+            </a:r>
+          </a:p>
+          <a:p>
+            <a:pPr lvl="2"/>
+            <a:r>
+              <a:rPr lang="en-US" dirty="0"/>
+              <a:t>Tuition, Starting Salary, Cost of living, Question: What percent of salary will you spend towards Loan?</a:t>
             </a:r>
           </a:p>
           <a:p>
             <a:pPr lvl="1"/>
             <a:r>
-              <a:rPr lang="en-US" dirty="0"/>
-              <a:t>How much they have to pay every month to pay off student loan (ML)</a:t>
-            </a:r>
-          </a:p>
-          <a:p>
-            <a:pPr lvl="1"/>
-            <a:r>
-              <a:rPr lang="en-US" dirty="0"/>
+              <a:rPr lang="en-US" dirty="0">
+                <a:solidFill>
+                  <a:srgbClr val="FFC000"/>
+                </a:solidFill>
+              </a:rPr>
               <a:t>Scrape indeed for Internships based on industry and state (if we have time)</a:t>
             </a:r>
           </a:p>
@@ -3924,14 +3957,10 @@
             <a:pPr lvl="1"/>
             <a:r>
               <a:rPr lang="en-US" dirty="0"/>
-              <a:t>Some </a:t>
-            </a:r>
-            <a:r>
-              <a:rPr lang="en-US"/>
-              <a:t>graphs from here: </a:t>
-            </a:r>
-            <a:r>
-              <a:rPr lang="en-US">
+              <a:t>Some graphs from here: </a:t>
+            </a:r>
+            <a:r>
+              <a:rPr lang="en-US" dirty="0">
                 <a:hlinkClick r:id="rId2"/>
               </a:rPr>
               <a:t>https://www.valuepenguin.com/student-loans/average-cost-of-college</a:t>

</xml_diff>